<commit_message>
correct geocoding and worked on presentation (slide 2)
</commit_message>
<xml_diff>
--- a/project_presentation.pptx
+++ b/project_presentation.pptx
@@ -3591,6 +3591,43 @@
         </a:p>
       </dgm:t>
     </dgm:pt>
+    <dgm:pt modelId="{59291119-1E29-4E74-9FC0-BD5691099CD7}">
+      <dgm:prSet phldrT="[Text]"/>
+      <dgm:spPr/>
+      <dgm:t>
+        <a:bodyPr/>
+        <a:lstStyle/>
+        <a:p>
+          <a:r>
+            <a:rPr lang="en-GB" dirty="0" err="1"/>
+            <a:t>georeference</a:t>
+          </a:r>
+          <a:endParaRPr lang="en-GB" dirty="0"/>
+        </a:p>
+      </dgm:t>
+    </dgm:pt>
+    <dgm:pt modelId="{05E0A96D-6B51-4597-AD11-F2F1C14334F7}" type="parTrans" cxnId="{DEBD6535-DFD0-45DD-9F4B-C91F4DDA77BD}">
+      <dgm:prSet/>
+      <dgm:spPr/>
+      <dgm:t>
+        <a:bodyPr/>
+        <a:lstStyle/>
+        <a:p>
+          <a:endParaRPr lang="en-GB"/>
+        </a:p>
+      </dgm:t>
+    </dgm:pt>
+    <dgm:pt modelId="{E6E56088-B907-4EE3-BCD1-77743F04A082}" type="sibTrans" cxnId="{DEBD6535-DFD0-45DD-9F4B-C91F4DDA77BD}">
+      <dgm:prSet/>
+      <dgm:spPr/>
+      <dgm:t>
+        <a:bodyPr/>
+        <a:lstStyle/>
+        <a:p>
+          <a:endParaRPr lang="en-GB"/>
+        </a:p>
+      </dgm:t>
+    </dgm:pt>
     <dgm:pt modelId="{4E66BC1C-09CD-44F3-B7AE-CCC97F03051C}" type="pres">
       <dgm:prSet presAssocID="{F537E2FA-FA2B-4CEB-A5F4-0CD649D9031D}" presName="Name0" presStyleCnt="0">
         <dgm:presLayoutVars>
@@ -3857,15 +3894,18 @@
     </dgm:pt>
   </dgm:ptLst>
   <dgm:cxnLst>
+    <dgm:cxn modelId="{0E98D307-7F43-4058-A742-86684313360A}" type="presOf" srcId="{59291119-1E29-4E74-9FC0-BD5691099CD7}" destId="{878A1CC2-9BA0-4237-AEA2-6438964AAAD9}" srcOrd="0" destOrd="1" presId="urn:microsoft.com/office/officeart/2005/8/layout/hProcess4"/>
     <dgm:cxn modelId="{3F0A1109-D92D-49A2-92AE-0E3121D68A17}" type="presOf" srcId="{69AC95A5-C086-4F75-B1F5-835D5F983B9F}" destId="{3C406412-3C51-4212-BC2A-588FC6F6E550}" srcOrd="0" destOrd="0" presId="urn:microsoft.com/office/officeart/2005/8/layout/hProcess4"/>
     <dgm:cxn modelId="{82303509-1AC9-4531-B18F-02E8A9678DC8}" srcId="{A3006F2F-4F65-468C-B29D-300FB5921730}" destId="{1378F689-11D7-471C-AB0A-B0F030337C45}" srcOrd="0" destOrd="0" parTransId="{AE9D28E2-AE7A-4FE9-83C4-3FD1B2EAFDAB}" sibTransId="{6C72D1D1-F61E-4CCC-8ED9-F7F5966853BA}"/>
     <dgm:cxn modelId="{6E4C3511-1CD5-4099-A68D-E06727289458}" srcId="{F537E2FA-FA2B-4CEB-A5F4-0CD649D9031D}" destId="{C01671D1-875E-4044-BBC0-43E981A43D6B}" srcOrd="0" destOrd="0" parTransId="{FD5DD10F-53DC-4A1D-AFA7-36B251C7D0D3}" sibTransId="{B1637762-F063-44D9-BF93-3DA4A4621C02}"/>
     <dgm:cxn modelId="{953B6112-6BFA-4472-897F-155840E15A63}" type="presOf" srcId="{B7F2C1E7-C028-4E7A-A119-628AE6C6234E}" destId="{128022A0-5A06-4A64-B12F-872F5C91E62E}" srcOrd="1" destOrd="0" presId="urn:microsoft.com/office/officeart/2005/8/layout/hProcess4"/>
     <dgm:cxn modelId="{578ECA18-BE19-46F1-87CF-60A666116736}" type="presOf" srcId="{B1637762-F063-44D9-BF93-3DA4A4621C02}" destId="{D79F7A34-9AFD-488E-B1BE-10EAE6818318}" srcOrd="0" destOrd="0" presId="urn:microsoft.com/office/officeart/2005/8/layout/hProcess4"/>
+    <dgm:cxn modelId="{047EB922-4B16-478F-A23F-59E34BAF3034}" type="presOf" srcId="{59291119-1E29-4E74-9FC0-BD5691099CD7}" destId="{52AC3E3D-558C-4481-A898-004FF7E1E64A}" srcOrd="1" destOrd="1" presId="urn:microsoft.com/office/officeart/2005/8/layout/hProcess4"/>
     <dgm:cxn modelId="{D3EC2C23-21E1-4864-9E8C-C7E362FB992E}" type="presOf" srcId="{8352006D-0A17-4628-BC86-B6A5205A89E9}" destId="{86BDCF7A-8E72-4B24-9467-8CA118736A8F}" srcOrd="1" destOrd="1" presId="urn:microsoft.com/office/officeart/2005/8/layout/hProcess4"/>
     <dgm:cxn modelId="{C7C63E23-3EBE-400D-8EAD-3ECD3298E760}" type="presOf" srcId="{22542940-A22B-4C02-94F6-2BEA4D9988CA}" destId="{DAB245D2-053C-4DFC-9C1C-439CE91E4AE6}" srcOrd="0" destOrd="0" presId="urn:microsoft.com/office/officeart/2005/8/layout/hProcess4"/>
     <dgm:cxn modelId="{4758A02F-402C-4E3A-842C-68DBBC07EEA9}" type="presOf" srcId="{1378F689-11D7-471C-AB0A-B0F030337C45}" destId="{86BDCF7A-8E72-4B24-9467-8CA118736A8F}" srcOrd="1" destOrd="0" presId="urn:microsoft.com/office/officeart/2005/8/layout/hProcess4"/>
     <dgm:cxn modelId="{BE7DEB2F-7C00-4F18-8C37-6CA4C5BB97D0}" type="presOf" srcId="{204146BF-6155-40A7-A05D-0CD7AB0A81A9}" destId="{019E2575-FCA5-4588-BB5F-D7BF13E1CEE0}" srcOrd="0" destOrd="0" presId="urn:microsoft.com/office/officeart/2005/8/layout/hProcess4"/>
+    <dgm:cxn modelId="{DEBD6535-DFD0-45DD-9F4B-C91F4DDA77BD}" srcId="{0E928719-68D7-440D-9765-81EBD2F94C22}" destId="{59291119-1E29-4E74-9FC0-BD5691099CD7}" srcOrd="1" destOrd="0" parTransId="{05E0A96D-6B51-4597-AD11-F2F1C14334F7}" sibTransId="{E6E56088-B907-4EE3-BCD1-77743F04A082}"/>
     <dgm:cxn modelId="{E4FE9F39-8738-46C9-9F02-977BBD88804F}" srcId="{F537E2FA-FA2B-4CEB-A5F4-0CD649D9031D}" destId="{880CD8B0-B73F-4539-AA16-E532DAF11FF5}" srcOrd="3" destOrd="0" parTransId="{3BF59C67-3913-4BEA-9596-052A25F68DDC}" sibTransId="{75394124-C7CB-4002-9F34-25FF9AE4F320}"/>
     <dgm:cxn modelId="{59643D3D-A4DA-4762-B19D-E18A81DF1C15}" srcId="{880CD8B0-B73F-4539-AA16-E532DAF11FF5}" destId="{4E840C73-A7AA-4F25-A2E4-7A4E90E0F0E9}" srcOrd="1" destOrd="0" parTransId="{FDD9B3E4-6185-4018-A394-F7FBB7B63EDE}" sibTransId="{9CD4D325-7E0B-4670-8FED-E9F01D2F81E7}"/>
     <dgm:cxn modelId="{0EE8D03D-64BC-422B-B1B6-802DE860F525}" srcId="{F537E2FA-FA2B-4CEB-A5F4-0CD649D9031D}" destId="{A3006F2F-4F65-468C-B29D-300FB5921730}" srcOrd="2" destOrd="0" parTransId="{F0EFE99D-C4F4-4962-A2A5-4B6B1CF8DA8F}" sibTransId="{FA521859-A8AA-424F-A60B-9C48ADD96FF9}"/>
@@ -5013,6 +5053,25 @@
             <a:rPr lang="en-GB" sz="1200" kern="1200" dirty="0"/>
             <a:t>Customize the data</a:t>
           </a:r>
+        </a:p>
+        <a:p>
+          <a:pPr marL="114300" lvl="1" indent="-114300" algn="l" defTabSz="533400">
+            <a:lnSpc>
+              <a:spcPct val="90000"/>
+            </a:lnSpc>
+            <a:spcBef>
+              <a:spcPct val="0"/>
+            </a:spcBef>
+            <a:spcAft>
+              <a:spcPct val="15000"/>
+            </a:spcAft>
+            <a:buChar char="•"/>
+          </a:pPr>
+          <a:r>
+            <a:rPr lang="en-GB" sz="1200" kern="1200" dirty="0" err="1"/>
+            <a:t>georeference</a:t>
+          </a:r>
+          <a:endParaRPr lang="en-GB" sz="1200" kern="1200" dirty="0"/>
         </a:p>
       </dsp:txBody>
       <dsp:txXfrm>
@@ -10760,7 +10819,7 @@
           <a:p>
             <a:fld id="{3F706EB3-28CB-432B-BE3D-93E599BE6327}" type="datetimeFigureOut">
               <a:rPr lang="en-GB" smtClean="0"/>
-              <a:t>21/01/2022</a:t>
+              <a:t>25/01/2022</a:t>
             </a:fld>
             <a:endParaRPr lang="en-GB"/>
           </a:p>
@@ -11072,84 +11131,10 @@
           <a:bodyPr/>
           <a:lstStyle/>
           <a:p>
-            <a:pPr marL="0" indent="0">
-              <a:buFont typeface="Arial" panose="020B0604020202020204" pitchFamily="34" charset="0"/>
-              <a:buNone/>
-            </a:pPr>
             <a:r>
               <a:rPr lang="en-GB" dirty="0"/>
-              <a:t>ZIELE</a:t>
+              <a:t>Welcome to the presentation of Mel and I – we decided to work with the Flow Map plugin and created a project with its help.</a:t>
             </a:r>
-          </a:p>
-          <a:p>
-            <a:pPr marL="171450" indent="-171450">
-              <a:buFont typeface="Arial" panose="020B0604020202020204" pitchFamily="34" charset="0"/>
-              <a:buChar char="•"/>
-            </a:pPr>
-            <a:r>
-              <a:rPr lang="en-GB" dirty="0"/>
-              <a:t>Flow map um die Migration </a:t>
-            </a:r>
-            <a:r>
-              <a:rPr lang="en-GB" dirty="0" err="1"/>
-              <a:t>darzustellen</a:t>
-            </a:r>
-            <a:endParaRPr lang="en-GB" dirty="0"/>
-          </a:p>
-          <a:p>
-            <a:pPr marL="171450" indent="-171450">
-              <a:buFont typeface="Arial" panose="020B0604020202020204" pitchFamily="34" charset="0"/>
-              <a:buChar char="•"/>
-            </a:pPr>
-            <a:r>
-              <a:rPr lang="en-GB" dirty="0"/>
-              <a:t>Ein- und </a:t>
-            </a:r>
-            <a:r>
-              <a:rPr lang="en-GB" dirty="0" err="1"/>
-              <a:t>Auswanderungen</a:t>
-            </a:r>
-            <a:r>
-              <a:rPr lang="en-GB" dirty="0"/>
-              <a:t> </a:t>
-            </a:r>
-            <a:r>
-              <a:rPr lang="en-GB" dirty="0" err="1"/>
-              <a:t>im</a:t>
-            </a:r>
-            <a:r>
-              <a:rPr lang="en-GB" dirty="0"/>
-              <a:t> </a:t>
-            </a:r>
-            <a:r>
-              <a:rPr lang="en-GB" dirty="0" err="1"/>
-              <a:t>Jahr</a:t>
-            </a:r>
-            <a:r>
-              <a:rPr lang="en-GB" dirty="0"/>
-              <a:t> 2020</a:t>
-            </a:r>
-          </a:p>
-          <a:p>
-            <a:pPr marL="171450" indent="-171450">
-              <a:buFont typeface="Arial" panose="020B0604020202020204" pitchFamily="34" charset="0"/>
-              <a:buChar char="•"/>
-            </a:pPr>
-            <a:r>
-              <a:rPr lang="en-GB" dirty="0" err="1"/>
-              <a:t>Darstellungen</a:t>
-            </a:r>
-            <a:r>
-              <a:rPr lang="en-GB" dirty="0"/>
-              <a:t> in Leaflet</a:t>
-            </a:r>
-          </a:p>
-          <a:p>
-            <a:pPr marL="171450" indent="-171450">
-              <a:buFont typeface="Arial" panose="020B0604020202020204" pitchFamily="34" charset="0"/>
-              <a:buChar char="•"/>
-            </a:pPr>
-            <a:endParaRPr lang="en-GB" dirty="0"/>
           </a:p>
         </p:txBody>
       </p:sp>
@@ -11170,7 +11155,7 @@
           <a:p>
             <a:fld id="{89483034-6DAD-4439-842F-5AC941C32EE8}" type="slidenum">
               <a:rPr lang="en-GB" smtClean="0"/>
-              <a:t>2</a:t>
+              <a:t>1</a:t>
             </a:fld>
             <a:endParaRPr lang="en-GB"/>
           </a:p>
@@ -11179,7 +11164,7 @@
     </p:spTree>
     <p:extLst>
       <p:ext uri="{BB962C8B-B14F-4D97-AF65-F5344CB8AC3E}">
-        <p14:creationId xmlns:p14="http://schemas.microsoft.com/office/powerpoint/2010/main" val="3871285992"/>
+        <p14:creationId xmlns:p14="http://schemas.microsoft.com/office/powerpoint/2010/main" val="4145599824"/>
       </p:ext>
     </p:extLst>
   </p:cSld>
@@ -11232,6 +11217,141 @@
         <p:txBody>
           <a:bodyPr/>
           <a:lstStyle/>
+          <a:p>
+            <a:pPr marL="0" indent="0">
+              <a:buFont typeface="Arial" panose="020B0604020202020204" pitchFamily="34" charset="0"/>
+              <a:buNone/>
+            </a:pPr>
+            <a:r>
+              <a:rPr lang="en-GB" dirty="0"/>
+              <a:t>For our project we defined a set of goals:</a:t>
+            </a:r>
+          </a:p>
+          <a:p>
+            <a:pPr marL="171450" indent="-171450">
+              <a:buFont typeface="Arial" panose="020B0604020202020204" pitchFamily="34" charset="0"/>
+              <a:buChar char="•"/>
+            </a:pPr>
+            <a:r>
+              <a:rPr lang="en-GB" dirty="0"/>
+              <a:t>The first goal of ours was to create a flow map. One of the most interesting datasets for this kind of visualization is in our opinion migration data. This way we can showcase the movement of many people and it may also imply the relationship of people to other countries (for example: the most immigrants in 2020 were Germans)</a:t>
+            </a:r>
+          </a:p>
+          <a:p>
+            <a:pPr marL="171450" indent="-171450">
+              <a:buFont typeface="Arial" panose="020B0604020202020204" pitchFamily="34" charset="0"/>
+              <a:buChar char="•"/>
+            </a:pPr>
+            <a:r>
+              <a:rPr lang="en-GB" dirty="0"/>
+              <a:t>For the task, we decided to use data the immigrations and emigrations from and to Austria in the year of 2020. We obtained the according data from </a:t>
+            </a:r>
+            <a:r>
+              <a:rPr lang="en-GB" dirty="0" err="1"/>
+              <a:t>Statistik</a:t>
+            </a:r>
+            <a:r>
+              <a:rPr lang="en-GB" dirty="0"/>
+              <a:t> Austria.</a:t>
+            </a:r>
+          </a:p>
+          <a:p>
+            <a:pPr marL="171450" indent="-171450">
+              <a:buFont typeface="Arial" panose="020B0604020202020204" pitchFamily="34" charset="0"/>
+              <a:buChar char="•"/>
+            </a:pPr>
+            <a:r>
+              <a:rPr lang="en-GB" dirty="0"/>
+              <a:t>Mel and I have chosen to use Leaflet because we wanted to get to know the flow map plugin. Additionally, we preferred Leaflet because it is an open-source library and therefore we have the full control over our map.</a:t>
+            </a:r>
+          </a:p>
+        </p:txBody>
+      </p:sp>
+      <p:sp>
+        <p:nvSpPr>
+          <p:cNvPr id="4" name="Foliennummernplatzhalter 3"/>
+          <p:cNvSpPr>
+            <a:spLocks noGrp="1"/>
+          </p:cNvSpPr>
+          <p:nvPr>
+            <p:ph type="sldNum" sz="quarter" idx="5"/>
+          </p:nvPr>
+        </p:nvSpPr>
+        <p:spPr/>
+        <p:txBody>
+          <a:bodyPr/>
+          <a:lstStyle/>
+          <a:p>
+            <a:fld id="{89483034-6DAD-4439-842F-5AC941C32EE8}" type="slidenum">
+              <a:rPr lang="en-GB" smtClean="0"/>
+              <a:t>2</a:t>
+            </a:fld>
+            <a:endParaRPr lang="en-GB"/>
+          </a:p>
+        </p:txBody>
+      </p:sp>
+    </p:spTree>
+    <p:extLst>
+      <p:ext uri="{BB962C8B-B14F-4D97-AF65-F5344CB8AC3E}">
+        <p14:creationId xmlns:p14="http://schemas.microsoft.com/office/powerpoint/2010/main" val="3871285992"/>
+      </p:ext>
+    </p:extLst>
+  </p:cSld>
+  <p:clrMapOvr>
+    <a:masterClrMapping/>
+  </p:clrMapOvr>
+</p:notes>
+</file>
+
+<file path=ppt/notesSlides/notesSlide3.xml><?xml version="1.0" encoding="utf-8"?>
+<p:notes xmlns:a="http://schemas.openxmlformats.org/drawingml/2006/main" xmlns:r="http://schemas.openxmlformats.org/officeDocument/2006/relationships" xmlns:p="http://schemas.openxmlformats.org/presentationml/2006/main">
+  <p:cSld>
+    <p:spTree>
+      <p:nvGrpSpPr>
+        <p:cNvPr id="1" name=""/>
+        <p:cNvGrpSpPr/>
+        <p:nvPr/>
+      </p:nvGrpSpPr>
+      <p:grpSpPr>
+        <a:xfrm>
+          <a:off x="0" y="0"/>
+          <a:ext cx="0" cy="0"/>
+          <a:chOff x="0" y="0"/>
+          <a:chExt cx="0" cy="0"/>
+        </a:xfrm>
+      </p:grpSpPr>
+      <p:sp>
+        <p:nvSpPr>
+          <p:cNvPr id="2" name="Folienbildplatzhalter 1"/>
+          <p:cNvSpPr>
+            <a:spLocks noGrp="1" noRot="1" noChangeAspect="1"/>
+          </p:cNvSpPr>
+          <p:nvPr>
+            <p:ph type="sldImg"/>
+          </p:nvPr>
+        </p:nvSpPr>
+        <p:spPr/>
+      </p:sp>
+      <p:sp>
+        <p:nvSpPr>
+          <p:cNvPr id="3" name="Notizenplatzhalter 2"/>
+          <p:cNvSpPr>
+            <a:spLocks noGrp="1"/>
+          </p:cNvSpPr>
+          <p:nvPr>
+            <p:ph type="body" idx="1"/>
+          </p:nvPr>
+        </p:nvSpPr>
+        <p:spPr/>
+        <p:txBody>
+          <a:bodyPr/>
+          <a:lstStyle/>
+          <a:p>
+            <a:endParaRPr lang="en-GB" dirty="0"/>
+          </a:p>
+          <a:p>
+            <a:endParaRPr lang="en-GB" dirty="0"/>
+          </a:p>
           <a:p>
             <a:r>
               <a:rPr lang="en-GB" dirty="0"/>
@@ -11554,7 +11674,7 @@
 </p:notes>
 </file>
 
-<file path=ppt/notesSlides/notesSlide3.xml><?xml version="1.0" encoding="utf-8"?>
+<file path=ppt/notesSlides/notesSlide4.xml><?xml version="1.0" encoding="utf-8"?>
 <p:notes xmlns:a="http://schemas.openxmlformats.org/drawingml/2006/main" xmlns:r="http://schemas.openxmlformats.org/officeDocument/2006/relationships" xmlns:p="http://schemas.openxmlformats.org/presentationml/2006/main">
   <p:cSld>
     <p:spTree>
@@ -11662,7 +11782,7 @@
 </p:notes>
 </file>
 
-<file path=ppt/notesSlides/notesSlide4.xml><?xml version="1.0" encoding="utf-8"?>
+<file path=ppt/notesSlides/notesSlide5.xml><?xml version="1.0" encoding="utf-8"?>
 <p:notes xmlns:a="http://schemas.openxmlformats.org/drawingml/2006/main" xmlns:r="http://schemas.openxmlformats.org/officeDocument/2006/relationships" xmlns:p="http://schemas.openxmlformats.org/presentationml/2006/main">
   <p:cSld>
     <p:spTree>
@@ -11893,7 +12013,7 @@
           <a:p>
             <a:fld id="{76969C88-B244-455D-A017-012B25B1ACDD}" type="datetimeFigureOut">
               <a:rPr lang="en-US" smtClean="0"/>
-              <a:t>1/21/2022</a:t>
+              <a:t>1/25/2022</a:t>
             </a:fld>
             <a:endParaRPr lang="en-US"/>
           </a:p>
@@ -12091,7 +12211,7 @@
           <a:p>
             <a:fld id="{76969C88-B244-455D-A017-012B25B1ACDD}" type="datetimeFigureOut">
               <a:rPr lang="en-US" smtClean="0"/>
-              <a:t>1/21/2022</a:t>
+              <a:t>1/25/2022</a:t>
             </a:fld>
             <a:endParaRPr lang="en-US"/>
           </a:p>
@@ -12299,7 +12419,7 @@
           <a:p>
             <a:fld id="{76969C88-B244-455D-A017-012B25B1ACDD}" type="datetimeFigureOut">
               <a:rPr lang="en-US" smtClean="0"/>
-              <a:t>1/21/2022</a:t>
+              <a:t>1/25/2022</a:t>
             </a:fld>
             <a:endParaRPr lang="en-US"/>
           </a:p>
@@ -12498,7 +12618,7 @@
           <a:p>
             <a:fld id="{76969C88-B244-455D-A017-012B25B1ACDD}" type="datetimeFigureOut">
               <a:rPr lang="en-US" smtClean="0"/>
-              <a:t>1/21/2022</a:t>
+              <a:t>1/25/2022</a:t>
             </a:fld>
             <a:endParaRPr lang="en-US"/>
           </a:p>
@@ -12773,7 +12893,7 @@
           <a:p>
             <a:fld id="{76969C88-B244-455D-A017-012B25B1ACDD}" type="datetimeFigureOut">
               <a:rPr lang="en-US" smtClean="0"/>
-              <a:t>1/21/2022</a:t>
+              <a:t>1/25/2022</a:t>
             </a:fld>
             <a:endParaRPr lang="en-US"/>
           </a:p>
@@ -13038,7 +13158,7 @@
           <a:p>
             <a:fld id="{76969C88-B244-455D-A017-012B25B1ACDD}" type="datetimeFigureOut">
               <a:rPr lang="en-US" smtClean="0"/>
-              <a:t>1/21/2022</a:t>
+              <a:t>1/25/2022</a:t>
             </a:fld>
             <a:endParaRPr lang="en-US"/>
           </a:p>
@@ -13450,7 +13570,7 @@
           <a:p>
             <a:fld id="{76969C88-B244-455D-A017-012B25B1ACDD}" type="datetimeFigureOut">
               <a:rPr lang="en-US" smtClean="0"/>
-              <a:t>1/21/2022</a:t>
+              <a:t>1/25/2022</a:t>
             </a:fld>
             <a:endParaRPr lang="en-US"/>
           </a:p>
@@ -13591,7 +13711,7 @@
           <a:p>
             <a:fld id="{76969C88-B244-455D-A017-012B25B1ACDD}" type="datetimeFigureOut">
               <a:rPr lang="en-US" smtClean="0"/>
-              <a:t>1/21/2022</a:t>
+              <a:t>1/25/2022</a:t>
             </a:fld>
             <a:endParaRPr lang="en-US"/>
           </a:p>
@@ -13704,7 +13824,7 @@
           <a:p>
             <a:fld id="{76969C88-B244-455D-A017-012B25B1ACDD}" type="datetimeFigureOut">
               <a:rPr lang="en-US" smtClean="0"/>
-              <a:t>1/21/2022</a:t>
+              <a:t>1/25/2022</a:t>
             </a:fld>
             <a:endParaRPr lang="en-US"/>
           </a:p>
@@ -14016,7 +14136,7 @@
           <a:p>
             <a:fld id="{76969C88-B244-455D-A017-012B25B1ACDD}" type="datetimeFigureOut">
               <a:rPr lang="en-US" smtClean="0"/>
-              <a:t>1/21/2022</a:t>
+              <a:t>1/25/2022</a:t>
             </a:fld>
             <a:endParaRPr lang="en-US"/>
           </a:p>
@@ -14307,7 +14427,7 @@
           <a:p>
             <a:fld id="{76969C88-B244-455D-A017-012B25B1ACDD}" type="datetimeFigureOut">
               <a:rPr lang="en-US" smtClean="0"/>
-              <a:t>1/21/2022</a:t>
+              <a:t>1/25/2022</a:t>
             </a:fld>
             <a:endParaRPr lang="en-US"/>
           </a:p>
@@ -15063,7 +15183,7 @@
             <a:fld id="{76969C88-B244-455D-A017-012B25B1ACDD}" type="datetimeFigureOut">
               <a:rPr lang="en-US" smtClean="0"/>
               <a:pPr/>
-              <a:t>1/21/2022</a:t>
+              <a:t>1/25/2022</a:t>
             </a:fld>
             <a:endParaRPr lang="en-US"/>
           </a:p>
@@ -15591,7 +15711,7 @@
           <p:nvPr/>
         </p:nvPicPr>
         <p:blipFill rotWithShape="1">
-          <a:blip r:embed="rId2"/>
+          <a:blip r:embed="rId3"/>
           <a:srcRect t="3805" r="-1" b="-1"/>
           <a:stretch/>
         </p:blipFill>
@@ -16492,7 +16612,7 @@
             </a:pPr>
             <a:r>
               <a:rPr lang="en-GB" sz="2400" dirty="0"/>
-              <a:t>Use of leaflet</a:t>
+              <a:t>Use of Leaflet</a:t>
             </a:r>
           </a:p>
         </p:txBody>
@@ -16526,7 +16646,7 @@
           <a:lstStyle/>
           <a:p>
             <a:r>
-              <a:rPr lang="en-GB" sz="3600" dirty="0"/>
+              <a:rPr lang="en-GB" dirty="0"/>
               <a:t>Goals</a:t>
             </a:r>
           </a:p>
@@ -17173,8 +17293,8 @@
         </p:nvSpPr>
         <p:spPr>
           <a:xfrm>
-            <a:off x="718751" y="762000"/>
-            <a:ext cx="3598808" cy="2286000"/>
+            <a:off x="1121924" y="496111"/>
+            <a:ext cx="2600528" cy="953310"/>
           </a:xfrm>
         </p:spPr>
         <p:txBody>
@@ -17183,8 +17303,9 @@
           </a:bodyPr>
           <a:lstStyle/>
           <a:p>
+            <a:pPr algn="ctr"/>
             <a:r>
-              <a:rPr lang="en-GB" sz="3200">
+              <a:rPr lang="en-GB" dirty="0">
                 <a:solidFill>
                   <a:srgbClr val="FFFFFF"/>
                 </a:solidFill>
@@ -17299,7 +17420,7 @@
             <p:ph idx="1"/>
             <p:extLst>
               <p:ext uri="{D42A27DB-BD31-4B8C-83A1-F6EECF244321}">
-                <p14:modId xmlns:p14="http://schemas.microsoft.com/office/powerpoint/2010/main" val="2972492783"/>
+                <p14:modId xmlns:p14="http://schemas.microsoft.com/office/powerpoint/2010/main" val="1886172002"/>
               </p:ext>
             </p:extLst>
           </p:nvPr>
@@ -19530,12 +19651,18 @@
           <a:lstStyle/>
           <a:p>
             <a:r>
-              <a:rPr lang="en-GB" sz="2400"/>
+              <a:rPr lang="en-GB" sz="2400" dirty="0"/>
               <a:t>Visualize more than one year</a:t>
             </a:r>
           </a:p>
           <a:p>
-            <a:endParaRPr lang="en-GB" sz="2400"/>
+            <a:r>
+              <a:rPr lang="en-GB" sz="2400" dirty="0"/>
+              <a:t>Showcase the number of people more visually</a:t>
+            </a:r>
+          </a:p>
+          <a:p>
+            <a:endParaRPr lang="en-GB" sz="2400" dirty="0"/>
           </a:p>
         </p:txBody>
       </p:sp>

</xml_diff>